<commit_message>
Cambiate immagini, aggiornata presentazione
</commit_message>
<xml_diff>
--- a/documentazione/BankRobbery.pptx
+++ b/documentazione/BankRobbery.pptx
@@ -263,7 +263,7 @@
           <a:p>
             <a:fld id="{A38BC211-87E7-4C75-868E-3E1D8BC7F1A4}" type="datetimeFigureOut">
               <a:rPr lang="it-IT" smtClean="0"/>
-              <a:t>05/06/2020</a:t>
+              <a:t>06/06/2020</a:t>
             </a:fld>
             <a:endParaRPr lang="it-IT"/>
           </a:p>
@@ -461,7 +461,7 @@
           <a:p>
             <a:fld id="{A38BC211-87E7-4C75-868E-3E1D8BC7F1A4}" type="datetimeFigureOut">
               <a:rPr lang="it-IT" smtClean="0"/>
-              <a:t>05/06/2020</a:t>
+              <a:t>06/06/2020</a:t>
             </a:fld>
             <a:endParaRPr lang="it-IT"/>
           </a:p>
@@ -669,7 +669,7 @@
           <a:p>
             <a:fld id="{A38BC211-87E7-4C75-868E-3E1D8BC7F1A4}" type="datetimeFigureOut">
               <a:rPr lang="it-IT" smtClean="0"/>
-              <a:t>05/06/2020</a:t>
+              <a:t>06/06/2020</a:t>
             </a:fld>
             <a:endParaRPr lang="it-IT"/>
           </a:p>
@@ -867,7 +867,7 @@
           <a:p>
             <a:fld id="{A38BC211-87E7-4C75-868E-3E1D8BC7F1A4}" type="datetimeFigureOut">
               <a:rPr lang="it-IT" smtClean="0"/>
-              <a:t>05/06/2020</a:t>
+              <a:t>06/06/2020</a:t>
             </a:fld>
             <a:endParaRPr lang="it-IT"/>
           </a:p>
@@ -1142,7 +1142,7 @@
           <a:p>
             <a:fld id="{A38BC211-87E7-4C75-868E-3E1D8BC7F1A4}" type="datetimeFigureOut">
               <a:rPr lang="it-IT" smtClean="0"/>
-              <a:t>05/06/2020</a:t>
+              <a:t>06/06/2020</a:t>
             </a:fld>
             <a:endParaRPr lang="it-IT"/>
           </a:p>
@@ -1407,7 +1407,7 @@
           <a:p>
             <a:fld id="{A38BC211-87E7-4C75-868E-3E1D8BC7F1A4}" type="datetimeFigureOut">
               <a:rPr lang="it-IT" smtClean="0"/>
-              <a:t>05/06/2020</a:t>
+              <a:t>06/06/2020</a:t>
             </a:fld>
             <a:endParaRPr lang="it-IT"/>
           </a:p>
@@ -1819,7 +1819,7 @@
           <a:p>
             <a:fld id="{A38BC211-87E7-4C75-868E-3E1D8BC7F1A4}" type="datetimeFigureOut">
               <a:rPr lang="it-IT" smtClean="0"/>
-              <a:t>05/06/2020</a:t>
+              <a:t>06/06/2020</a:t>
             </a:fld>
             <a:endParaRPr lang="it-IT"/>
           </a:p>
@@ -1960,7 +1960,7 @@
           <a:p>
             <a:fld id="{A38BC211-87E7-4C75-868E-3E1D8BC7F1A4}" type="datetimeFigureOut">
               <a:rPr lang="it-IT" smtClean="0"/>
-              <a:t>05/06/2020</a:t>
+              <a:t>06/06/2020</a:t>
             </a:fld>
             <a:endParaRPr lang="it-IT"/>
           </a:p>
@@ -2073,7 +2073,7 @@
           <a:p>
             <a:fld id="{A38BC211-87E7-4C75-868E-3E1D8BC7F1A4}" type="datetimeFigureOut">
               <a:rPr lang="it-IT" smtClean="0"/>
-              <a:t>05/06/2020</a:t>
+              <a:t>06/06/2020</a:t>
             </a:fld>
             <a:endParaRPr lang="it-IT"/>
           </a:p>
@@ -2384,7 +2384,7 @@
           <a:p>
             <a:fld id="{A38BC211-87E7-4C75-868E-3E1D8BC7F1A4}" type="datetimeFigureOut">
               <a:rPr lang="it-IT" smtClean="0"/>
-              <a:t>05/06/2020</a:t>
+              <a:t>06/06/2020</a:t>
             </a:fld>
             <a:endParaRPr lang="it-IT"/>
           </a:p>
@@ -2672,7 +2672,7 @@
           <a:p>
             <a:fld id="{A38BC211-87E7-4C75-868E-3E1D8BC7F1A4}" type="datetimeFigureOut">
               <a:rPr lang="it-IT" smtClean="0"/>
-              <a:t>05/06/2020</a:t>
+              <a:t>06/06/2020</a:t>
             </a:fld>
             <a:endParaRPr lang="it-IT"/>
           </a:p>
@@ -2913,7 +2913,7 @@
           <a:p>
             <a:fld id="{A38BC211-87E7-4C75-868E-3E1D8BC7F1A4}" type="datetimeFigureOut">
               <a:rPr lang="it-IT" smtClean="0"/>
-              <a:t>05/06/2020</a:t>
+              <a:t>06/06/2020</a:t>
             </a:fld>
             <a:endParaRPr lang="it-IT"/>
           </a:p>
@@ -4831,13 +4831,13 @@
               </a:ext>
             </a:extLst>
           </a:blip>
-          <a:srcRect l="571" t="4930" r="10690" b="4093"/>
+          <a:srcRect t="4000" r="12048" b="5358"/>
           <a:stretch/>
         </p:blipFill>
         <p:spPr>
           <a:xfrm>
-            <a:off x="7294105" y="1340082"/>
-            <a:ext cx="4036303" cy="5046539"/>
+            <a:off x="7218706" y="1301156"/>
+            <a:ext cx="4183181" cy="5101560"/>
           </a:xfrm>
           <a:prstGeom prst="rect">
             <a:avLst/>
@@ -5371,7 +5371,7 @@
         <p:spPr>
           <a:xfrm>
             <a:off x="921407" y="3032556"/>
-            <a:ext cx="6382419" cy="3436938"/>
+            <a:ext cx="6382419" cy="3368013"/>
           </a:xfrm>
           <a:prstGeom prst="rect">
             <a:avLst/>
@@ -5415,13 +5415,13 @@
               </a:ext>
             </a:extLst>
           </a:blip>
-          <a:srcRect l="10326" t="2806" r="9473" b="4682"/>
+          <a:srcRect l="10170" t="1444" r="9417" b="4214"/>
           <a:stretch/>
         </p:blipFill>
         <p:spPr>
           <a:xfrm>
-            <a:off x="7819296" y="1259405"/>
-            <a:ext cx="3547321" cy="5228190"/>
+            <a:off x="7709763" y="1424442"/>
+            <a:ext cx="3842374" cy="4976127"/>
           </a:xfrm>
           <a:prstGeom prst="rect">
             <a:avLst/>
@@ -5882,8 +5882,8 @@
         </p:nvSpPr>
         <p:spPr>
           <a:xfrm>
-            <a:off x="515470" y="1155700"/>
-            <a:ext cx="11161059" cy="5435600"/>
+            <a:off x="515470" y="978730"/>
+            <a:ext cx="11161059" cy="5612570"/>
           </a:xfrm>
           <a:prstGeom prst="rect">
             <a:avLst/>
@@ -5977,8 +5977,8 @@
         </p:blipFill>
         <p:spPr>
           <a:xfrm>
-            <a:off x="679201" y="2739363"/>
-            <a:ext cx="5416799" cy="3505208"/>
+            <a:off x="674746" y="3021449"/>
+            <a:ext cx="5416799" cy="3429896"/>
           </a:xfrm>
           <a:prstGeom prst="rect">
             <a:avLst/>
@@ -6027,8 +6027,8 @@
         </p:blipFill>
         <p:spPr>
           <a:xfrm>
-            <a:off x="6268950" y="2739363"/>
-            <a:ext cx="5248304" cy="3531522"/>
+            <a:off x="6250821" y="3021448"/>
+            <a:ext cx="5248304" cy="3429897"/>
           </a:xfrm>
           <a:prstGeom prst="rect">
             <a:avLst/>
@@ -6345,8 +6345,8 @@
         </p:nvSpPr>
         <p:spPr>
           <a:xfrm>
-            <a:off x="652182" y="1316391"/>
-            <a:ext cx="10904180" cy="1200329"/>
+            <a:off x="652182" y="1122926"/>
+            <a:ext cx="10904180" cy="1754326"/>
           </a:xfrm>
           <a:prstGeom prst="rect">
             <a:avLst/>
@@ -6365,7 +6365,7 @@
                   <a:schemeClr val="bg1"/>
                 </a:solidFill>
               </a:rPr>
-              <a:t>Per concludere abbiamo effettuare una simulazione generica per visualizzare quali gli attacchi più probabili per una banca e definire quindi quali sono gli elementi in cui essa deve focalizzarsi per aumentare la sua sicurezza e come ci aspettavamo l’attacco preferito risulta essere il furto di credenziali, siano essere degli utenti tramite il phishing che del direttore tramite un attacco al sistema informatico.</a:t>
+              <a:t>Per concludere abbiamo effettuare una simulazione generica per visualizzare quali sono gli attacchi più probabili per una banca e definire quindi gli elementi su cui essa deve focalizzarsi per aumentare la sua sicurezza e quella dei suoi clienti. Come ci aspettavamo gli attacchi più probabili risultano essere quelli ad approccio informatico, una banca per rimanere sicura deve investire molte risorse nel proteggere sia le sue strutture informatiche che i propri clienti in quanto un attacco complesso anche se può dare alti guadagni data la poca propensione ad essere effettuato non rappresenta il suo problema principale.</a:t>
             </a:r>
           </a:p>
         </p:txBody>

</xml_diff>

<commit_message>
Modificate immagini, aggiornata presentazione e doc
</commit_message>
<xml_diff>
--- a/documentazione/BankRobbery.pptx
+++ b/documentazione/BankRobbery.pptx
@@ -4831,13 +4831,13 @@
               </a:ext>
             </a:extLst>
           </a:blip>
-          <a:srcRect t="4000" r="12048" b="5358"/>
+          <a:srcRect t="3948" r="10916" b="4631"/>
           <a:stretch/>
         </p:blipFill>
         <p:spPr>
           <a:xfrm>
-            <a:off x="7218706" y="1301156"/>
-            <a:ext cx="4183181" cy="5101560"/>
+            <a:off x="7249119" y="1301156"/>
+            <a:ext cx="4081505" cy="5108172"/>
           </a:xfrm>
           <a:prstGeom prst="rect">
             <a:avLst/>

</xml_diff>